<commit_message>
new update slide deck
</commit_message>
<xml_diff>
--- a/Recipe Decider_2.pptx
+++ b/Recipe Decider_2.pptx
@@ -13,6 +13,7 @@
     <p:sldId id="260" r:id="rId7"/>
     <p:sldId id="261" r:id="rId8"/>
     <p:sldId id="262" r:id="rId9"/>
+    <p:sldId id="265" r:id="rId10"/>
   </p:sldIdLst>
   <p:sldSz cx="9144000" cy="6858000" type="screen4x3"/>
   <p:notesSz cx="6858000" cy="9144000"/>
@@ -6032,6 +6033,35 @@
           <a:p>
             <a:endParaRPr lang="en-AU" dirty="0"/>
           </a:p>
+          <a:p>
+            <a:r>
+              <a:rPr lang="en-AU" dirty="0" err="1"/>
+              <a:t>Api</a:t>
+            </a:r>
+            <a:r>
+              <a:rPr lang="en-AU" dirty="0"/>
+              <a:t> sources </a:t>
+            </a:r>
+          </a:p>
+          <a:p>
+            <a:r>
+              <a:rPr lang="en-AU" dirty="0" err="1"/>
+              <a:t>Spoonacular</a:t>
+            </a:r>
+            <a:endParaRPr lang="en-AU" dirty="0"/>
+          </a:p>
+          <a:p>
+            <a:r>
+              <a:rPr lang="en-AU" dirty="0"/>
+              <a:t>Open movie database</a:t>
+            </a:r>
+          </a:p>
+          <a:p>
+            <a:endParaRPr lang="en-AU" dirty="0"/>
+          </a:p>
+          <a:p>
+            <a:endParaRPr lang="en-AU" dirty="0"/>
+          </a:p>
         </p:txBody>
       </p:sp>
       <p:pic>
@@ -6102,6 +6132,135 @@
     <p:extLst>
       <p:ext uri="{BB962C8B-B14F-4D97-AF65-F5344CB8AC3E}">
         <p14:creationId xmlns:p14="http://schemas.microsoft.com/office/powerpoint/2010/main" val="2076760495"/>
+      </p:ext>
+    </p:extLst>
+  </p:cSld>
+  <p:clrMapOvr>
+    <a:masterClrMapping/>
+  </p:clrMapOvr>
+</p:sld>
+</file>
+
+<file path=ppt/slides/slide9.xml><?xml version="1.0" encoding="utf-8"?>
+<p:sld xmlns:a="http://schemas.openxmlformats.org/drawingml/2006/main" xmlns:r="http://schemas.openxmlformats.org/officeDocument/2006/relationships" xmlns:p="http://schemas.openxmlformats.org/presentationml/2006/main">
+  <p:cSld>
+    <p:spTree>
+      <p:nvGrpSpPr>
+        <p:cNvPr id="1" name=""/>
+        <p:cNvGrpSpPr/>
+        <p:nvPr/>
+      </p:nvGrpSpPr>
+      <p:grpSpPr>
+        <a:xfrm>
+          <a:off x="0" y="0"/>
+          <a:ext cx="0" cy="0"/>
+          <a:chOff x="0" y="0"/>
+          <a:chExt cx="0" cy="0"/>
+        </a:xfrm>
+      </p:grpSpPr>
+      <p:sp>
+        <p:nvSpPr>
+          <p:cNvPr id="2" name="Title 1"/>
+          <p:cNvSpPr>
+            <a:spLocks noGrp="1"/>
+          </p:cNvSpPr>
+          <p:nvPr>
+            <p:ph type="title"/>
+          </p:nvPr>
+        </p:nvSpPr>
+        <p:spPr>
+          <a:xfrm>
+            <a:off x="822960" y="347653"/>
+            <a:ext cx="7520940" cy="548640"/>
+          </a:xfrm>
+        </p:spPr>
+        <p:txBody>
+          <a:bodyPr/>
+          <a:lstStyle/>
+          <a:p>
+            <a:r>
+              <a:rPr lang="en-AU" dirty="0"/>
+              <a:t>Participation</a:t>
+            </a:r>
+          </a:p>
+        </p:txBody>
+      </p:sp>
+      <p:sp>
+        <p:nvSpPr>
+          <p:cNvPr id="3" name="Content Placeholder 2"/>
+          <p:cNvSpPr>
+            <a:spLocks noGrp="1"/>
+          </p:cNvSpPr>
+          <p:nvPr>
+            <p:ph idx="1"/>
+          </p:nvPr>
+        </p:nvSpPr>
+        <p:spPr/>
+        <p:txBody>
+          <a:bodyPr/>
+          <a:lstStyle/>
+          <a:p>
+            <a:r>
+              <a:rPr lang="en-AU" dirty="0"/>
+              <a:t>Dan – Html, Readme , Product Research, </a:t>
+            </a:r>
+            <a:r>
+              <a:rPr lang="en-AU" dirty="0" err="1"/>
+              <a:t>Wireframing</a:t>
+            </a:r>
+            <a:endParaRPr lang="en-AU" dirty="0"/>
+          </a:p>
+          <a:p>
+            <a:r>
+              <a:rPr lang="en-AU" dirty="0"/>
+              <a:t>Filipe  - JS, Product Research, </a:t>
+            </a:r>
+            <a:r>
+              <a:rPr lang="en-AU" dirty="0" err="1"/>
+              <a:t>Wireframing</a:t>
+            </a:r>
+            <a:endParaRPr lang="en-AU" dirty="0"/>
+          </a:p>
+          <a:p>
+            <a:r>
+              <a:rPr lang="en-AU" dirty="0"/>
+              <a:t>May – CSS , Product Research, </a:t>
+            </a:r>
+            <a:r>
+              <a:rPr lang="en-AU" dirty="0" err="1"/>
+              <a:t>Wireframing</a:t>
+            </a:r>
+            <a:endParaRPr lang="en-AU" dirty="0"/>
+          </a:p>
+          <a:p>
+            <a:r>
+              <a:rPr lang="en-AU" dirty="0"/>
+              <a:t>Vittorio – Html, Product Research, </a:t>
+            </a:r>
+            <a:r>
+              <a:rPr lang="en-AU" dirty="0" err="1"/>
+              <a:t>Wireframing</a:t>
+            </a:r>
+            <a:r>
+              <a:rPr lang="en-AU" dirty="0"/>
+              <a:t>, Presentation</a:t>
+            </a:r>
+          </a:p>
+          <a:p>
+            <a:endParaRPr lang="en-AU" dirty="0"/>
+          </a:p>
+          <a:p>
+            <a:r>
+              <a:rPr lang="en-AU" dirty="0"/>
+              <a:t>These were the core aspects that we worked on, but the project was a collaborative effort with help and guidance across all areas by all participants .  </a:t>
+            </a:r>
+          </a:p>
+        </p:txBody>
+      </p:sp>
+    </p:spTree>
+    <p:extLst>
+      <p:ext uri="{BB962C8B-B14F-4D97-AF65-F5344CB8AC3E}">
+        <p14:creationId xmlns:p14="http://schemas.microsoft.com/office/powerpoint/2010/main" val="2328971831"/>
       </p:ext>
     </p:extLst>
   </p:cSld>

</xml_diff>